<commit_message>
indiv genetic diversity update
</commit_message>
<xml_diff>
--- a/RESULTS/Diversity_and_Distance/Genetic_Distance/dendro_with_diversity.pptx
+++ b/RESULTS/Diversity_and_Distance/Genetic_Distance/dendro_with_diversity.pptx
@@ -294,7 +294,7 @@
           <a:p>
             <a:fld id="{D07B72BA-6177-7245-B8F8-36C98E2D6A33}" type="datetimeFigureOut">
               <a:rPr lang="en-US" smtClean="0"/>
-              <a:t>12/8/20</a:t>
+              <a:t>1/21/21</a:t>
             </a:fld>
             <a:endParaRPr lang="en-US"/>
           </a:p>
@@ -464,7 +464,7 @@
           <a:p>
             <a:fld id="{D07B72BA-6177-7245-B8F8-36C98E2D6A33}" type="datetimeFigureOut">
               <a:rPr lang="en-US" smtClean="0"/>
-              <a:t>12/8/20</a:t>
+              <a:t>1/21/21</a:t>
             </a:fld>
             <a:endParaRPr lang="en-US"/>
           </a:p>
@@ -644,7 +644,7 @@
           <a:p>
             <a:fld id="{D07B72BA-6177-7245-B8F8-36C98E2D6A33}" type="datetimeFigureOut">
               <a:rPr lang="en-US" smtClean="0"/>
-              <a:t>12/8/20</a:t>
+              <a:t>1/21/21</a:t>
             </a:fld>
             <a:endParaRPr lang="en-US"/>
           </a:p>
@@ -814,7 +814,7 @@
           <a:p>
             <a:fld id="{D07B72BA-6177-7245-B8F8-36C98E2D6A33}" type="datetimeFigureOut">
               <a:rPr lang="en-US" smtClean="0"/>
-              <a:t>12/8/20</a:t>
+              <a:t>1/21/21</a:t>
             </a:fld>
             <a:endParaRPr lang="en-US"/>
           </a:p>
@@ -1060,7 +1060,7 @@
           <a:p>
             <a:fld id="{D07B72BA-6177-7245-B8F8-36C98E2D6A33}" type="datetimeFigureOut">
               <a:rPr lang="en-US" smtClean="0"/>
-              <a:t>12/8/20</a:t>
+              <a:t>1/21/21</a:t>
             </a:fld>
             <a:endParaRPr lang="en-US"/>
           </a:p>
@@ -1348,7 +1348,7 @@
           <a:p>
             <a:fld id="{D07B72BA-6177-7245-B8F8-36C98E2D6A33}" type="datetimeFigureOut">
               <a:rPr lang="en-US" smtClean="0"/>
-              <a:t>12/8/20</a:t>
+              <a:t>1/21/21</a:t>
             </a:fld>
             <a:endParaRPr lang="en-US"/>
           </a:p>
@@ -1770,7 +1770,7 @@
           <a:p>
             <a:fld id="{D07B72BA-6177-7245-B8F8-36C98E2D6A33}" type="datetimeFigureOut">
               <a:rPr lang="en-US" smtClean="0"/>
-              <a:t>12/8/20</a:t>
+              <a:t>1/21/21</a:t>
             </a:fld>
             <a:endParaRPr lang="en-US"/>
           </a:p>
@@ -1888,7 +1888,7 @@
           <a:p>
             <a:fld id="{D07B72BA-6177-7245-B8F8-36C98E2D6A33}" type="datetimeFigureOut">
               <a:rPr lang="en-US" smtClean="0"/>
-              <a:t>12/8/20</a:t>
+              <a:t>1/21/21</a:t>
             </a:fld>
             <a:endParaRPr lang="en-US"/>
           </a:p>
@@ -1983,7 +1983,7 @@
           <a:p>
             <a:fld id="{D07B72BA-6177-7245-B8F8-36C98E2D6A33}" type="datetimeFigureOut">
               <a:rPr lang="en-US" smtClean="0"/>
-              <a:t>12/8/20</a:t>
+              <a:t>1/21/21</a:t>
             </a:fld>
             <a:endParaRPr lang="en-US"/>
           </a:p>
@@ -2260,7 +2260,7 @@
           <a:p>
             <a:fld id="{D07B72BA-6177-7245-B8F8-36C98E2D6A33}" type="datetimeFigureOut">
               <a:rPr lang="en-US" smtClean="0"/>
-              <a:t>12/8/20</a:t>
+              <a:t>1/21/21</a:t>
             </a:fld>
             <a:endParaRPr lang="en-US"/>
           </a:p>
@@ -2517,7 +2517,7 @@
           <a:p>
             <a:fld id="{D07B72BA-6177-7245-B8F8-36C98E2D6A33}" type="datetimeFigureOut">
               <a:rPr lang="en-US" smtClean="0"/>
-              <a:t>12/8/20</a:t>
+              <a:t>1/21/21</a:t>
             </a:fld>
             <a:endParaRPr lang="en-US"/>
           </a:p>
@@ -2730,7 +2730,7 @@
           <a:p>
             <a:fld id="{D07B72BA-6177-7245-B8F8-36C98E2D6A33}" type="datetimeFigureOut">
               <a:rPr lang="en-US" smtClean="0"/>
-              <a:t>12/8/20</a:t>
+              <a:t>1/21/21</a:t>
             </a:fld>
             <a:endParaRPr lang="en-US"/>
           </a:p>
@@ -3107,10 +3107,10 @@
       </p:grpSpPr>
       <p:pic>
         <p:nvPicPr>
-          <p:cNvPr id="7" name="Picture 6">
+          <p:cNvPr id="3" name="Picture 2">
             <a:extLst>
               <a:ext uri="{FF2B5EF4-FFF2-40B4-BE49-F238E27FC236}">
-                <a16:creationId xmlns:a16="http://schemas.microsoft.com/office/drawing/2014/main" id="{BD5D56C2-49DB-E848-94D0-AF5A62495DAA}"/>
+                <a16:creationId xmlns:a16="http://schemas.microsoft.com/office/drawing/2014/main" id="{83A271D3-7C08-454E-8F51-B2914D2F41FC}"/>
               </a:ext>
             </a:extLst>
           </p:cNvPr>
@@ -3127,8 +3127,8 @@
         </p:blipFill>
         <p:spPr>
           <a:xfrm>
-            <a:off x="0" y="39189"/>
-            <a:ext cx="9144000" cy="3657600"/>
+            <a:off x="7720147" y="42226"/>
+            <a:ext cx="1371601" cy="1371601"/>
           </a:xfrm>
           <a:prstGeom prst="rect">
             <a:avLst/>
@@ -3137,10 +3137,10 @@
       </p:pic>
       <p:pic>
         <p:nvPicPr>
-          <p:cNvPr id="13" name="Picture 12">
+          <p:cNvPr id="7" name="Picture 6">
             <a:extLst>
               <a:ext uri="{FF2B5EF4-FFF2-40B4-BE49-F238E27FC236}">
-                <a16:creationId xmlns:a16="http://schemas.microsoft.com/office/drawing/2014/main" id="{CFD5F3E6-7F9F-794C-806E-4B57F2E2C46A}"/>
+                <a16:creationId xmlns:a16="http://schemas.microsoft.com/office/drawing/2014/main" id="{BD5D56C2-49DB-E848-94D0-AF5A62495DAA}"/>
               </a:ext>
             </a:extLst>
           </p:cNvPr>
@@ -3157,8 +3157,8 @@
         </p:blipFill>
         <p:spPr>
           <a:xfrm>
-            <a:off x="7720148" y="26126"/>
-            <a:ext cx="1371601" cy="1371601"/>
+            <a:off x="0" y="39189"/>
+            <a:ext cx="9144000" cy="3657600"/>
           </a:xfrm>
           <a:prstGeom prst="rect">
             <a:avLst/>

</xml_diff>

<commit_message>
"final" updates on results while finalising methods
</commit_message>
<xml_diff>
--- a/RESULTS/Diversity_and_Distance/Genetic_Distance/dendro_with_diversity.pptx
+++ b/RESULTS/Diversity_and_Distance/Genetic_Distance/dendro_with_diversity.pptx
@@ -6,7 +6,8 @@
   </p:sldMasterIdLst>
   <p:sldIdLst>
     <p:sldId id="256" r:id="rId2"/>
-    <p:sldId id="257" r:id="rId3"/>
+    <p:sldId id="258" r:id="rId3"/>
+    <p:sldId id="257" r:id="rId4"/>
   </p:sldIdLst>
   <p:sldSz cx="9144000" cy="3657600"/>
   <p:notesSz cx="6858000" cy="9144000"/>
@@ -294,7 +295,7 @@
           <a:p>
             <a:fld id="{D07B72BA-6177-7245-B8F8-36C98E2D6A33}" type="datetimeFigureOut">
               <a:rPr lang="en-US" smtClean="0"/>
-              <a:t>1/21/21</a:t>
+              <a:t>4/16/21</a:t>
             </a:fld>
             <a:endParaRPr lang="en-US"/>
           </a:p>
@@ -464,7 +465,7 @@
           <a:p>
             <a:fld id="{D07B72BA-6177-7245-B8F8-36C98E2D6A33}" type="datetimeFigureOut">
               <a:rPr lang="en-US" smtClean="0"/>
-              <a:t>1/21/21</a:t>
+              <a:t>4/16/21</a:t>
             </a:fld>
             <a:endParaRPr lang="en-US"/>
           </a:p>
@@ -644,7 +645,7 @@
           <a:p>
             <a:fld id="{D07B72BA-6177-7245-B8F8-36C98E2D6A33}" type="datetimeFigureOut">
               <a:rPr lang="en-US" smtClean="0"/>
-              <a:t>1/21/21</a:t>
+              <a:t>4/16/21</a:t>
             </a:fld>
             <a:endParaRPr lang="en-US"/>
           </a:p>
@@ -814,7 +815,7 @@
           <a:p>
             <a:fld id="{D07B72BA-6177-7245-B8F8-36C98E2D6A33}" type="datetimeFigureOut">
               <a:rPr lang="en-US" smtClean="0"/>
-              <a:t>1/21/21</a:t>
+              <a:t>4/16/21</a:t>
             </a:fld>
             <a:endParaRPr lang="en-US"/>
           </a:p>
@@ -1060,7 +1061,7 @@
           <a:p>
             <a:fld id="{D07B72BA-6177-7245-B8F8-36C98E2D6A33}" type="datetimeFigureOut">
               <a:rPr lang="en-US" smtClean="0"/>
-              <a:t>1/21/21</a:t>
+              <a:t>4/16/21</a:t>
             </a:fld>
             <a:endParaRPr lang="en-US"/>
           </a:p>
@@ -1348,7 +1349,7 @@
           <a:p>
             <a:fld id="{D07B72BA-6177-7245-B8F8-36C98E2D6A33}" type="datetimeFigureOut">
               <a:rPr lang="en-US" smtClean="0"/>
-              <a:t>1/21/21</a:t>
+              <a:t>4/16/21</a:t>
             </a:fld>
             <a:endParaRPr lang="en-US"/>
           </a:p>
@@ -1770,7 +1771,7 @@
           <a:p>
             <a:fld id="{D07B72BA-6177-7245-B8F8-36C98E2D6A33}" type="datetimeFigureOut">
               <a:rPr lang="en-US" smtClean="0"/>
-              <a:t>1/21/21</a:t>
+              <a:t>4/16/21</a:t>
             </a:fld>
             <a:endParaRPr lang="en-US"/>
           </a:p>
@@ -1888,7 +1889,7 @@
           <a:p>
             <a:fld id="{D07B72BA-6177-7245-B8F8-36C98E2D6A33}" type="datetimeFigureOut">
               <a:rPr lang="en-US" smtClean="0"/>
-              <a:t>1/21/21</a:t>
+              <a:t>4/16/21</a:t>
             </a:fld>
             <a:endParaRPr lang="en-US"/>
           </a:p>
@@ -1983,7 +1984,7 @@
           <a:p>
             <a:fld id="{D07B72BA-6177-7245-B8F8-36C98E2D6A33}" type="datetimeFigureOut">
               <a:rPr lang="en-US" smtClean="0"/>
-              <a:t>1/21/21</a:t>
+              <a:t>4/16/21</a:t>
             </a:fld>
             <a:endParaRPr lang="en-US"/>
           </a:p>
@@ -2260,7 +2261,7 @@
           <a:p>
             <a:fld id="{D07B72BA-6177-7245-B8F8-36C98E2D6A33}" type="datetimeFigureOut">
               <a:rPr lang="en-US" smtClean="0"/>
-              <a:t>1/21/21</a:t>
+              <a:t>4/16/21</a:t>
             </a:fld>
             <a:endParaRPr lang="en-US"/>
           </a:p>
@@ -2517,7 +2518,7 @@
           <a:p>
             <a:fld id="{D07B72BA-6177-7245-B8F8-36C98E2D6A33}" type="datetimeFigureOut">
               <a:rPr lang="en-US" smtClean="0"/>
-              <a:t>1/21/21</a:t>
+              <a:t>4/16/21</a:t>
             </a:fld>
             <a:endParaRPr lang="en-US"/>
           </a:p>
@@ -2730,7 +2731,7 @@
           <a:p>
             <a:fld id="{D07B72BA-6177-7245-B8F8-36C98E2D6A33}" type="datetimeFigureOut">
               <a:rPr lang="en-US" smtClean="0"/>
-              <a:t>1/21/21</a:t>
+              <a:t>4/16/21</a:t>
             </a:fld>
             <a:endParaRPr lang="en-US"/>
           </a:p>
@@ -3107,6 +3108,131 @@
       </p:grpSpPr>
       <p:pic>
         <p:nvPicPr>
+          <p:cNvPr id="4" name="Picture 3">
+            <a:extLst>
+              <a:ext uri="{FF2B5EF4-FFF2-40B4-BE49-F238E27FC236}">
+                <a16:creationId xmlns:a16="http://schemas.microsoft.com/office/drawing/2014/main" id="{98F1B7A4-AC32-2040-8A59-1672488A311F}"/>
+              </a:ext>
+            </a:extLst>
+          </p:cNvPr>
+          <p:cNvPicPr>
+            <a:picLocks noChangeAspect="1"/>
+          </p:cNvPicPr>
+          <p:nvPr/>
+        </p:nvPicPr>
+        <p:blipFill>
+          <a:blip r:embed="rId2"/>
+          <a:stretch>
+            <a:fillRect/>
+          </a:stretch>
+        </p:blipFill>
+        <p:spPr>
+          <a:xfrm>
+            <a:off x="0" y="0"/>
+            <a:ext cx="9144000" cy="3657600"/>
+          </a:xfrm>
+          <a:prstGeom prst="rect">
+            <a:avLst/>
+          </a:prstGeom>
+        </p:spPr>
+      </p:pic>
+      <p:pic>
+        <p:nvPicPr>
+          <p:cNvPr id="3" name="Picture 2">
+            <a:extLst>
+              <a:ext uri="{FF2B5EF4-FFF2-40B4-BE49-F238E27FC236}">
+                <a16:creationId xmlns:a16="http://schemas.microsoft.com/office/drawing/2014/main" id="{83A271D3-7C08-454E-8F51-B2914D2F41FC}"/>
+              </a:ext>
+            </a:extLst>
+          </p:cNvPr>
+          <p:cNvPicPr>
+            <a:picLocks noChangeAspect="1"/>
+          </p:cNvPicPr>
+          <p:nvPr/>
+        </p:nvPicPr>
+        <p:blipFill>
+          <a:blip r:embed="rId3"/>
+          <a:stretch>
+            <a:fillRect/>
+          </a:stretch>
+        </p:blipFill>
+        <p:spPr>
+          <a:xfrm>
+            <a:off x="7720147" y="42226"/>
+            <a:ext cx="1371601" cy="1371601"/>
+          </a:xfrm>
+          <a:prstGeom prst="rect">
+            <a:avLst/>
+          </a:prstGeom>
+        </p:spPr>
+      </p:pic>
+      <p:sp>
+        <p:nvSpPr>
+          <p:cNvPr id="15" name="TextBox 14">
+            <a:extLst>
+              <a:ext uri="{FF2B5EF4-FFF2-40B4-BE49-F238E27FC236}">
+                <a16:creationId xmlns:a16="http://schemas.microsoft.com/office/drawing/2014/main" id="{D365ECA1-B4C2-B647-A2D5-9D5ED24E2449}"/>
+              </a:ext>
+            </a:extLst>
+          </p:cNvPr>
+          <p:cNvSpPr txBox="1"/>
+          <p:nvPr/>
+        </p:nvSpPr>
+        <p:spPr>
+          <a:xfrm>
+            <a:off x="7418702" y="-12702"/>
+            <a:ext cx="364202" cy="276999"/>
+          </a:xfrm>
+          <a:prstGeom prst="rect">
+            <a:avLst/>
+          </a:prstGeom>
+          <a:noFill/>
+        </p:spPr>
+        <p:txBody>
+          <a:bodyPr wrap="none" rtlCol="0">
+            <a:spAutoFit/>
+          </a:bodyPr>
+          <a:lstStyle/>
+          <a:p>
+            <a:r>
+              <a:rPr lang="en-US" sz="1200"/>
+              <a:t>(c)</a:t>
+            </a:r>
+          </a:p>
+        </p:txBody>
+      </p:sp>
+    </p:spTree>
+    <p:extLst>
+      <p:ext uri="{BB962C8B-B14F-4D97-AF65-F5344CB8AC3E}">
+        <p14:creationId xmlns:p14="http://schemas.microsoft.com/office/powerpoint/2010/main" val="3781596328"/>
+      </p:ext>
+    </p:extLst>
+  </p:cSld>
+  <p:clrMapOvr>
+    <a:masterClrMapping/>
+  </p:clrMapOvr>
+</p:sld>
+</file>
+
+<file path=ppt/slides/slide2.xml><?xml version="1.0" encoding="utf-8"?>
+<p:sld xmlns:a="http://schemas.openxmlformats.org/drawingml/2006/main" xmlns:r="http://schemas.openxmlformats.org/officeDocument/2006/relationships" xmlns:p="http://schemas.openxmlformats.org/presentationml/2006/main">
+  <p:cSld>
+    <p:spTree>
+      <p:nvGrpSpPr>
+        <p:cNvPr id="1" name=""/>
+        <p:cNvGrpSpPr/>
+        <p:nvPr/>
+      </p:nvGrpSpPr>
+      <p:grpSpPr>
+        <a:xfrm>
+          <a:off x="0" y="0"/>
+          <a:ext cx="0" cy="0"/>
+          <a:chOff x="0" y="0"/>
+          <a:chExt cx="0" cy="0"/>
+        </a:xfrm>
+      </p:grpSpPr>
+      <p:pic>
+        <p:nvPicPr>
           <p:cNvPr id="3" name="Picture 2">
             <a:extLst>
               <a:ext uri="{FF2B5EF4-FFF2-40B4-BE49-F238E27FC236}">
@@ -3203,7 +3329,7 @@
     </p:spTree>
     <p:extLst>
       <p:ext uri="{BB962C8B-B14F-4D97-AF65-F5344CB8AC3E}">
-        <p14:creationId xmlns:p14="http://schemas.microsoft.com/office/powerpoint/2010/main" val="3781596328"/>
+        <p14:creationId xmlns:p14="http://schemas.microsoft.com/office/powerpoint/2010/main" val="187936595"/>
       </p:ext>
     </p:extLst>
   </p:cSld>
@@ -3213,7 +3339,7 @@
 </p:sld>
 </file>
 
-<file path=ppt/slides/slide2.xml><?xml version="1.0" encoding="utf-8"?>
+<file path=ppt/slides/slide3.xml><?xml version="1.0" encoding="utf-8"?>
 <p:sld xmlns:a="http://schemas.openxmlformats.org/drawingml/2006/main" xmlns:r="http://schemas.openxmlformats.org/officeDocument/2006/relationships" xmlns:p="http://schemas.openxmlformats.org/presentationml/2006/main">
   <p:cSld>
     <p:spTree>

</xml_diff>